<commit_message>
Trasferimento da "quizzipedia" a "docs"
</commit_message>
<xml_diff>
--- a/Piano di Progetto/Images/Grafici-PdP.pptx
+++ b/Piano di Progetto/Images/Grafici-PdP.pptx
@@ -12,6 +12,9 @@
     <p:sldId id="260" r:id="rId6"/>
     <p:sldId id="261" r:id="rId7"/>
     <p:sldId id="262" r:id="rId8"/>
+    <p:sldId id="263" r:id="rId9"/>
+    <p:sldId id="264" r:id="rId10"/>
+    <p:sldId id="265" r:id="rId11"/>
   </p:sldIdLst>
   <p:sldSz cx="9144000" cy="6858000" type="screen4x3"/>
   <p:notesSz cx="6858000" cy="9144000"/>
@@ -160,8 +163,8 @@
               <c:idx val="0"/>
               <c:layout>
                 <c:manualLayout>
-                  <c:x val="3.2617815091518301E-2"/>
-                  <c:y val="2.7042588456945675E-2"/>
+                  <c:x val="3.2617815091518308E-2"/>
+                  <c:y val="2.7042588456945679E-2"/>
                 </c:manualLayout>
               </c:layout>
               <c:dLblPos val="bestFit"/>
@@ -172,8 +175,8 @@
               <c:idx val="1"/>
               <c:layout>
                 <c:manualLayout>
-                  <c:x val="2.2949353553028136E-2"/>
-                  <c:y val="0.14566645816591978"/>
+                  <c:x val="2.2949353553028143E-2"/>
+                  <c:y val="0.1456664581659198"/>
                 </c:manualLayout>
               </c:layout>
               <c:dLblPos val="bestFit"/>
@@ -184,8 +187,8 @@
               <c:idx val="2"/>
               <c:layout>
                 <c:manualLayout>
-                  <c:x val="-6.3423529344618867E-2"/>
-                  <c:y val="-1.8930024853629348E-2"/>
+                  <c:x val="-6.3423529344618881E-2"/>
+                  <c:y val="-1.8930024853629351E-2"/>
                 </c:manualLayout>
               </c:layout>
               <c:dLblPos val="bestFit"/>
@@ -196,8 +199,8 @@
               <c:idx val="3"/>
               <c:layout>
                 <c:manualLayout>
-                  <c:x val="-6.8859831859871948E-2"/>
-                  <c:y val="4.5972400376807637E-2"/>
+                  <c:x val="-6.8859831859871962E-2"/>
+                  <c:y val="4.5972400376807644E-2"/>
                 </c:manualLayout>
               </c:layout>
               <c:dLblPos val="bestFit"/>
@@ -512,6 +515,533 @@
 </c:chartSpace>
 </file>
 
+<file path=ppt/charts/chart13.xml><?xml version="1.0" encoding="utf-8"?>
+<c:chartSpace xmlns:c="http://schemas.openxmlformats.org/drawingml/2006/chart" xmlns:a="http://schemas.openxmlformats.org/drawingml/2006/main" xmlns:r="http://schemas.openxmlformats.org/officeDocument/2006/relationships">
+  <c:lang val="it-IT"/>
+  <c:chart>
+    <c:plotArea>
+      <c:layout/>
+      <c:barChart>
+        <c:barDir val="bar"/>
+        <c:grouping val="clustered"/>
+        <c:ser>
+          <c:idx val="1"/>
+          <c:order val="0"/>
+          <c:tx>
+            <c:v>Effettive</c:v>
+          </c:tx>
+          <c:cat>
+            <c:strRef>
+              <c:f>(Consuntivi!$A$6:$A$8,Consuntivi!$A$11)</c:f>
+              <c:strCache>
+                <c:ptCount val="4"/>
+                <c:pt idx="0">
+                  <c:v>Responsabile</c:v>
+                </c:pt>
+                <c:pt idx="1">
+                  <c:v>Analista</c:v>
+                </c:pt>
+                <c:pt idx="2">
+                  <c:v>Amministratore</c:v>
+                </c:pt>
+                <c:pt idx="3">
+                  <c:v>Verificatore</c:v>
+                </c:pt>
+              </c:strCache>
+            </c:strRef>
+          </c:cat>
+          <c:val>
+            <c:numRef>
+              <c:f>(Consuntivi!$E$6:$E$8,Consuntivi!$E$11)</c:f>
+              <c:numCache>
+                <c:formatCode>General</c:formatCode>
+                <c:ptCount val="4"/>
+                <c:pt idx="0">
+                  <c:v>24</c:v>
+                </c:pt>
+                <c:pt idx="1">
+                  <c:v>46</c:v>
+                </c:pt>
+                <c:pt idx="2">
+                  <c:v>23</c:v>
+                </c:pt>
+                <c:pt idx="3">
+                  <c:v>42</c:v>
+                </c:pt>
+              </c:numCache>
+            </c:numRef>
+          </c:val>
+        </c:ser>
+        <c:ser>
+          <c:idx val="0"/>
+          <c:order val="1"/>
+          <c:tx>
+            <c:v>Pianificate</c:v>
+          </c:tx>
+          <c:cat>
+            <c:strRef>
+              <c:f>(Consuntivi!$A$6:$A$8,Consuntivi!$A$11)</c:f>
+              <c:strCache>
+                <c:ptCount val="4"/>
+                <c:pt idx="0">
+                  <c:v>Responsabile</c:v>
+                </c:pt>
+                <c:pt idx="1">
+                  <c:v>Analista</c:v>
+                </c:pt>
+                <c:pt idx="2">
+                  <c:v>Amministratore</c:v>
+                </c:pt>
+                <c:pt idx="3">
+                  <c:v>Verificatore</c:v>
+                </c:pt>
+              </c:strCache>
+            </c:strRef>
+          </c:cat>
+          <c:val>
+            <c:numRef>
+              <c:f>(Consuntivi!$C$6:$C$8,Consuntivi!$C$11)</c:f>
+              <c:numCache>
+                <c:formatCode>General</c:formatCode>
+                <c:ptCount val="4"/>
+                <c:pt idx="0">
+                  <c:v>21</c:v>
+                </c:pt>
+                <c:pt idx="1">
+                  <c:v>56</c:v>
+                </c:pt>
+                <c:pt idx="2">
+                  <c:v>25</c:v>
+                </c:pt>
+                <c:pt idx="3">
+                  <c:v>35</c:v>
+                </c:pt>
+              </c:numCache>
+            </c:numRef>
+          </c:val>
+        </c:ser>
+        <c:axId val="151784832"/>
+        <c:axId val="151901312"/>
+      </c:barChart>
+      <c:catAx>
+        <c:axId val="151784832"/>
+        <c:scaling>
+          <c:orientation val="minMax"/>
+        </c:scaling>
+        <c:axPos val="l"/>
+        <c:tickLblPos val="nextTo"/>
+        <c:crossAx val="151901312"/>
+        <c:crosses val="autoZero"/>
+        <c:auto val="1"/>
+        <c:lblAlgn val="ctr"/>
+        <c:lblOffset val="100"/>
+      </c:catAx>
+      <c:valAx>
+        <c:axId val="151901312"/>
+        <c:scaling>
+          <c:orientation val="minMax"/>
+        </c:scaling>
+        <c:axPos val="b"/>
+        <c:majorGridlines/>
+        <c:numFmt formatCode="General" sourceLinked="1"/>
+        <c:tickLblPos val="nextTo"/>
+        <c:crossAx val="151784832"/>
+        <c:crosses val="autoZero"/>
+        <c:crossBetween val="between"/>
+      </c:valAx>
+    </c:plotArea>
+    <c:legend>
+      <c:legendPos val="r"/>
+      <c:layout/>
+    </c:legend>
+    <c:plotVisOnly val="1"/>
+  </c:chart>
+  <c:txPr>
+    <a:bodyPr/>
+    <a:lstStyle/>
+    <a:p>
+      <a:pPr>
+        <a:defRPr sz="1600"/>
+      </a:pPr>
+      <a:endParaRPr lang="it-IT"/>
+    </a:p>
+  </c:txPr>
+  <c:externalData r:id="rId1"/>
+</c:chartSpace>
+</file>
+
+<file path=ppt/charts/chart14.xml><?xml version="1.0" encoding="utf-8"?>
+<c:chartSpace xmlns:c="http://schemas.openxmlformats.org/drawingml/2006/chart" xmlns:a="http://schemas.openxmlformats.org/drawingml/2006/main" xmlns:r="http://schemas.openxmlformats.org/officeDocument/2006/relationships">
+  <c:lang val="it-IT"/>
+  <c:chart>
+    <c:plotArea>
+      <c:layout/>
+      <c:barChart>
+        <c:barDir val="bar"/>
+        <c:grouping val="clustered"/>
+        <c:ser>
+          <c:idx val="1"/>
+          <c:order val="0"/>
+          <c:tx>
+            <c:v>Pianificazione v2</c:v>
+          </c:tx>
+          <c:cat>
+            <c:strRef>
+              <c:f>('Confronto p1 con p2'!$A$5:$A$8,'Confronto p1 con p2'!$A$10)</c:f>
+              <c:strCache>
+                <c:ptCount val="5"/>
+                <c:pt idx="0">
+                  <c:v>Responsabile</c:v>
+                </c:pt>
+                <c:pt idx="1">
+                  <c:v>Analista</c:v>
+                </c:pt>
+                <c:pt idx="2">
+                  <c:v>Amministratore</c:v>
+                </c:pt>
+                <c:pt idx="3">
+                  <c:v>Progettista</c:v>
+                </c:pt>
+                <c:pt idx="4">
+                  <c:v>Verificatore</c:v>
+                </c:pt>
+              </c:strCache>
+            </c:strRef>
+          </c:cat>
+          <c:val>
+            <c:numRef>
+              <c:f>('Confronto p1 con p2'!$C$5:$C$8,'Confronto p1 con p2'!$C$10)</c:f>
+              <c:numCache>
+                <c:formatCode>General</c:formatCode>
+                <c:ptCount val="5"/>
+                <c:pt idx="0">
+                  <c:v>15</c:v>
+                </c:pt>
+                <c:pt idx="1">
+                  <c:v>41</c:v>
+                </c:pt>
+                <c:pt idx="2">
+                  <c:v>15</c:v>
+                </c:pt>
+                <c:pt idx="3">
+                  <c:v>111</c:v>
+                </c:pt>
+                <c:pt idx="4">
+                  <c:v>80</c:v>
+                </c:pt>
+              </c:numCache>
+            </c:numRef>
+          </c:val>
+        </c:ser>
+        <c:ser>
+          <c:idx val="0"/>
+          <c:order val="1"/>
+          <c:tx>
+            <c:v>Pianificazione v1</c:v>
+          </c:tx>
+          <c:spPr>
+            <a:solidFill>
+              <a:schemeClr val="bg1">
+                <a:lumMod val="75000"/>
+              </a:schemeClr>
+            </a:solidFill>
+          </c:spPr>
+          <c:cat>
+            <c:strRef>
+              <c:f>('Confronto p1 con p2'!$A$5:$A$8,'Confronto p1 con p2'!$A$10)</c:f>
+              <c:strCache>
+                <c:ptCount val="5"/>
+                <c:pt idx="0">
+                  <c:v>Responsabile</c:v>
+                </c:pt>
+                <c:pt idx="1">
+                  <c:v>Analista</c:v>
+                </c:pt>
+                <c:pt idx="2">
+                  <c:v>Amministratore</c:v>
+                </c:pt>
+                <c:pt idx="3">
+                  <c:v>Progettista</c:v>
+                </c:pt>
+                <c:pt idx="4">
+                  <c:v>Verificatore</c:v>
+                </c:pt>
+              </c:strCache>
+            </c:strRef>
+          </c:cat>
+          <c:val>
+            <c:numRef>
+              <c:f>('Confronto p1 con p2'!$B$5:$B$8,'Confronto p1 con p2'!$B$10)</c:f>
+              <c:numCache>
+                <c:formatCode>General</c:formatCode>
+                <c:ptCount val="5"/>
+                <c:pt idx="0">
+                  <c:v>15</c:v>
+                </c:pt>
+                <c:pt idx="1">
+                  <c:v>30</c:v>
+                </c:pt>
+                <c:pt idx="2">
+                  <c:v>15</c:v>
+                </c:pt>
+                <c:pt idx="3">
+                  <c:v>112</c:v>
+                </c:pt>
+                <c:pt idx="4">
+                  <c:v>89</c:v>
+                </c:pt>
+              </c:numCache>
+            </c:numRef>
+          </c:val>
+        </c:ser>
+        <c:axId val="117634176"/>
+        <c:axId val="117635712"/>
+      </c:barChart>
+      <c:catAx>
+        <c:axId val="117634176"/>
+        <c:scaling>
+          <c:orientation val="minMax"/>
+        </c:scaling>
+        <c:axPos val="l"/>
+        <c:tickLblPos val="nextTo"/>
+        <c:crossAx val="117635712"/>
+        <c:crosses val="autoZero"/>
+        <c:auto val="1"/>
+        <c:lblAlgn val="ctr"/>
+        <c:lblOffset val="100"/>
+      </c:catAx>
+      <c:valAx>
+        <c:axId val="117635712"/>
+        <c:scaling>
+          <c:orientation val="minMax"/>
+        </c:scaling>
+        <c:axPos val="b"/>
+        <c:majorGridlines/>
+        <c:numFmt formatCode="General" sourceLinked="1"/>
+        <c:tickLblPos val="nextTo"/>
+        <c:crossAx val="117634176"/>
+        <c:crosses val="autoZero"/>
+        <c:crossBetween val="between"/>
+      </c:valAx>
+    </c:plotArea>
+    <c:legend>
+      <c:legendPos val="r"/>
+      <c:layout/>
+    </c:legend>
+    <c:plotVisOnly val="1"/>
+  </c:chart>
+  <c:txPr>
+    <a:bodyPr/>
+    <a:lstStyle/>
+    <a:p>
+      <a:pPr>
+        <a:defRPr sz="1600"/>
+      </a:pPr>
+      <a:endParaRPr lang="it-IT"/>
+    </a:p>
+  </c:txPr>
+  <c:externalData r:id="rId1"/>
+</c:chartSpace>
+</file>
+
+<file path=ppt/charts/chart15.xml><?xml version="1.0" encoding="utf-8"?>
+<c:chartSpace xmlns:c="http://schemas.openxmlformats.org/drawingml/2006/chart" xmlns:a="http://schemas.openxmlformats.org/drawingml/2006/main" xmlns:r="http://schemas.openxmlformats.org/officeDocument/2006/relationships">
+  <c:lang val="it-IT"/>
+  <c:chart>
+    <c:plotArea>
+      <c:layout>
+        <c:manualLayout>
+          <c:layoutTarget val="inner"/>
+          <c:xMode val="edge"/>
+          <c:yMode val="edge"/>
+          <c:x val="0.22371062992125978"/>
+          <c:y val="5.0925925925925923E-2"/>
+          <c:w val="0.49754768153980777"/>
+          <c:h val="0.83309419655876382"/>
+        </c:manualLayout>
+      </c:layout>
+      <c:barChart>
+        <c:barDir val="bar"/>
+        <c:grouping val="clustered"/>
+        <c:ser>
+          <c:idx val="1"/>
+          <c:order val="0"/>
+          <c:tx>
+            <c:v>Pianificazione v2</c:v>
+          </c:tx>
+          <c:cat>
+            <c:strRef>
+              <c:f>'Confronto p1 con p2'!$A$22:$A$27</c:f>
+              <c:strCache>
+                <c:ptCount val="6"/>
+                <c:pt idx="0">
+                  <c:v>Responsabile</c:v>
+                </c:pt>
+                <c:pt idx="1">
+                  <c:v>Analista</c:v>
+                </c:pt>
+                <c:pt idx="2">
+                  <c:v>Amministratore</c:v>
+                </c:pt>
+                <c:pt idx="3">
+                  <c:v>Progettista</c:v>
+                </c:pt>
+                <c:pt idx="4">
+                  <c:v>Programmatore</c:v>
+                </c:pt>
+                <c:pt idx="5">
+                  <c:v>Verificatore</c:v>
+                </c:pt>
+              </c:strCache>
+            </c:strRef>
+          </c:cat>
+          <c:val>
+            <c:numRef>
+              <c:f>'Confronto p1 con p2'!$C$22:$C$27</c:f>
+              <c:numCache>
+                <c:formatCode>General</c:formatCode>
+                <c:ptCount val="6"/>
+                <c:pt idx="0">
+                  <c:v>15</c:v>
+                </c:pt>
+                <c:pt idx="1">
+                  <c:v>10</c:v>
+                </c:pt>
+                <c:pt idx="2">
+                  <c:v>15</c:v>
+                </c:pt>
+                <c:pt idx="3">
+                  <c:v>20</c:v>
+                </c:pt>
+                <c:pt idx="4">
+                  <c:v>108</c:v>
+                </c:pt>
+                <c:pt idx="5">
+                  <c:v>71</c:v>
+                </c:pt>
+              </c:numCache>
+            </c:numRef>
+          </c:val>
+        </c:ser>
+        <c:ser>
+          <c:idx val="0"/>
+          <c:order val="1"/>
+          <c:tx>
+            <c:v>Pianificazione v1</c:v>
+          </c:tx>
+          <c:spPr>
+            <a:solidFill>
+              <a:schemeClr val="bg1">
+                <a:lumMod val="75000"/>
+              </a:schemeClr>
+            </a:solidFill>
+          </c:spPr>
+          <c:cat>
+            <c:strRef>
+              <c:f>'Confronto p1 con p2'!$A$22:$A$27</c:f>
+              <c:strCache>
+                <c:ptCount val="6"/>
+                <c:pt idx="0">
+                  <c:v>Responsabile</c:v>
+                </c:pt>
+                <c:pt idx="1">
+                  <c:v>Analista</c:v>
+                </c:pt>
+                <c:pt idx="2">
+                  <c:v>Amministratore</c:v>
+                </c:pt>
+                <c:pt idx="3">
+                  <c:v>Progettista</c:v>
+                </c:pt>
+                <c:pt idx="4">
+                  <c:v>Programmatore</c:v>
+                </c:pt>
+                <c:pt idx="5">
+                  <c:v>Verificatore</c:v>
+                </c:pt>
+              </c:strCache>
+            </c:strRef>
+          </c:cat>
+          <c:val>
+            <c:numRef>
+              <c:f>'Confronto p1 con p2'!$B$22:$B$27</c:f>
+              <c:numCache>
+                <c:formatCode>General</c:formatCode>
+                <c:ptCount val="6"/>
+                <c:pt idx="0">
+                  <c:v>15</c:v>
+                </c:pt>
+                <c:pt idx="1">
+                  <c:v>0</c:v>
+                </c:pt>
+                <c:pt idx="2">
+                  <c:v>15</c:v>
+                </c:pt>
+                <c:pt idx="3">
+                  <c:v>25</c:v>
+                </c:pt>
+                <c:pt idx="4">
+                  <c:v>118</c:v>
+                </c:pt>
+                <c:pt idx="5">
+                  <c:v>60</c:v>
+                </c:pt>
+              </c:numCache>
+            </c:numRef>
+          </c:val>
+        </c:ser>
+        <c:axId val="103250560"/>
+        <c:axId val="103261312"/>
+      </c:barChart>
+      <c:catAx>
+        <c:axId val="103250560"/>
+        <c:scaling>
+          <c:orientation val="minMax"/>
+        </c:scaling>
+        <c:axPos val="l"/>
+        <c:tickLblPos val="nextTo"/>
+        <c:crossAx val="103261312"/>
+        <c:crosses val="autoZero"/>
+        <c:auto val="1"/>
+        <c:lblAlgn val="ctr"/>
+        <c:lblOffset val="100"/>
+      </c:catAx>
+      <c:valAx>
+        <c:axId val="103261312"/>
+        <c:scaling>
+          <c:orientation val="minMax"/>
+          <c:max val="120"/>
+        </c:scaling>
+        <c:axPos val="b"/>
+        <c:majorGridlines/>
+        <c:numFmt formatCode="General" sourceLinked="1"/>
+        <c:tickLblPos val="nextTo"/>
+        <c:crossAx val="103250560"/>
+        <c:crosses val="autoZero"/>
+        <c:crossBetween val="between"/>
+        <c:majorUnit val="30"/>
+      </c:valAx>
+    </c:plotArea>
+    <c:legend>
+      <c:legendPos val="r"/>
+      <c:layout/>
+    </c:legend>
+    <c:plotVisOnly val="1"/>
+  </c:chart>
+  <c:txPr>
+    <a:bodyPr/>
+    <a:lstStyle/>
+    <a:p>
+      <a:pPr>
+        <a:defRPr sz="1600"/>
+      </a:pPr>
+      <a:endParaRPr lang="it-IT"/>
+    </a:p>
+  </c:txPr>
+  <c:externalData r:id="rId1"/>
+</c:chartSpace>
+</file>
+
 <file path=ppt/charts/chart2.xml><?xml version="1.0" encoding="utf-8"?>
 <c:chartSpace xmlns:c="http://schemas.openxmlformats.org/drawingml/2006/chart" xmlns:a="http://schemas.openxmlformats.org/drawingml/2006/main" xmlns:r="http://schemas.openxmlformats.org/officeDocument/2006/relationships">
   <c:lang val="it-IT"/>
@@ -588,8 +1118,8 @@
           <c:xMode val="edge"/>
           <c:yMode val="edge"/>
           <c:x val="0.20663090811260623"/>
-          <c:y val="0.11861750209572673"/>
-          <c:w val="0.53869875569381176"/>
+          <c:y val="0.11861750209572672"/>
+          <c:w val="0.53869875569381198"/>
           <c:h val="0.81621023589971486"/>
         </c:manualLayout>
       </c:layout>
@@ -603,8 +1133,8 @@
               <c:idx val="0"/>
               <c:layout>
                 <c:manualLayout>
-                  <c:x val="5.7539856682590824E-2"/>
-                  <c:y val="1.336131002279208E-2"/>
+                  <c:x val="5.7539856682590811E-2"/>
+                  <c:y val="1.3361310022792082E-2"/>
                 </c:manualLayout>
               </c:layout>
               <c:dLblPos val="bestFit"/>
@@ -617,7 +1147,7 @@
               <c:idx val="1"/>
               <c:layout>
                 <c:manualLayout>
-                  <c:x val="7.7777777777777779E-2"/>
+                  <c:x val="7.7777777777777793E-2"/>
                   <c:y val="0"/>
                 </c:manualLayout>
               </c:layout>
@@ -631,8 +1161,8 @@
               <c:idx val="2"/>
               <c:layout>
                 <c:manualLayout>
-                  <c:x val="3.1325767725154718E-2"/>
-                  <c:y val="-6.9615581433712754E-3"/>
+                  <c:x val="3.1325767725154732E-2"/>
+                  <c:y val="-6.9615581433712772E-3"/>
                 </c:manualLayout>
               </c:layout>
               <c:tx>
@@ -666,7 +1196,7 @@
               <c:idx val="3"/>
               <c:layout>
                 <c:manualLayout>
-                  <c:x val="6.0097072547494725E-2"/>
+                  <c:x val="6.0097072547494738E-2"/>
                   <c:y val="-1.2799293344510543E-2"/>
                 </c:manualLayout>
               </c:layout>
@@ -684,7 +1214,7 @@
               <c:idx val="5"/>
               <c:layout>
                 <c:manualLayout>
-                  <c:x val="-4.1666666666666664E-2"/>
+                  <c:x val="-4.1666666666666671E-2"/>
                   <c:y val="0"/>
                 </c:manualLayout>
               </c:layout>
@@ -819,8 +1349,8 @@
           <c:xMode val="edge"/>
           <c:yMode val="edge"/>
           <c:x val="0.24101021360874433"/>
-          <c:y val="0.13465107412307722"/>
-          <c:w val="0.51797957278251139"/>
+          <c:y val="0.1346510741230772"/>
+          <c:w val="0.5179795727825115"/>
           <c:h val="0.81621023589971486"/>
         </c:manualLayout>
       </c:layout>
@@ -868,8 +1398,8 @@
               <c:idx val="2"/>
               <c:layout>
                 <c:manualLayout>
-                  <c:x val="2.7863624127233727E-2"/>
-                  <c:y val="-4.6295361121491555E-3"/>
+                  <c:x val="2.7863624127233734E-2"/>
+                  <c:y val="-4.6295361121491563E-3"/>
                 </c:manualLayout>
               </c:layout>
               <c:spPr/>
@@ -908,7 +1438,7 @@
               <c:layout>
                 <c:manualLayout>
                   <c:x val="-9.8700705263517721E-2"/>
-                  <c:y val="-0.16203713055451752"/>
+                  <c:y val="-0.16203713055451754"/>
                 </c:manualLayout>
               </c:layout>
               <c:spPr/>
@@ -932,8 +1462,8 @@
               <c:idx val="5"/>
               <c:layout>
                 <c:manualLayout>
-                  <c:x val="-0.10219390687359524"/>
-                  <c:y val="-1.8726875465015577E-4"/>
+                  <c:x val="-0.10219390687359525"/>
+                  <c:y val="-1.8726875465015585E-4"/>
                 </c:manualLayout>
               </c:layout>
               <c:dLblPos val="bestFit"/>
@@ -1065,6 +1595,7 @@
 
 <file path=ppt/charts/chart8.xml><?xml version="1.0" encoding="utf-8"?>
 <c:chartSpace xmlns:c="http://schemas.openxmlformats.org/drawingml/2006/chart" xmlns:a="http://schemas.openxmlformats.org/drawingml/2006/main" xmlns:r="http://schemas.openxmlformats.org/officeDocument/2006/relationships">
+  <c:date1904 val="1"/>
   <c:lang val="it-IT"/>
   <c:chart>
     <c:plotArea>
@@ -1074,9 +1605,9 @@
           <c:xMode val="edge"/>
           <c:yMode val="edge"/>
           <c:x val="0.27083333333333326"/>
-          <c:y val="0.11342592592592599"/>
-          <c:w val="0.46388888888888946"/>
-          <c:h val="0.77314814814814881"/>
+          <c:y val="0.113425925925926"/>
+          <c:w val="0.46388888888888957"/>
+          <c:h val="0.77314814814814892"/>
         </c:manualLayout>
       </c:layout>
       <c:pieChart>
@@ -1109,7 +1640,7 @@
               <c:layout>
                 <c:manualLayout>
                   <c:x val="3.333333333333334E-2"/>
-                  <c:y val="1.3888888888888904E-2"/>
+                  <c:y val="1.3888888888888907E-2"/>
                 </c:manualLayout>
               </c:layout>
               <c:dLblPos val="bestFit"/>
@@ -1140,8 +1671,8 @@
               <c:idx val="3"/>
               <c:layout>
                 <c:manualLayout>
-                  <c:x val="3.0555555555555572E-2"/>
-                  <c:y val="2.7777777777777821E-2"/>
+                  <c:x val="3.0555555555555575E-2"/>
+                  <c:y val="2.7777777777777832E-2"/>
                 </c:manualLayout>
               </c:layout>
               <c:dLblPos val="bestFit"/>
@@ -1155,7 +1686,7 @@
               <c:layout>
                 <c:manualLayout>
                   <c:x val="3.333333333333334E-2"/>
-                  <c:y val="-9.2592592592592744E-3"/>
+                  <c:y val="-9.2592592592592778E-3"/>
                 </c:manualLayout>
               </c:layout>
               <c:dLblPos val="bestFit"/>
@@ -1459,7 +1990,7 @@
             <a:fld id="{862B2217-6051-4F56-814D-FF82A88DF6E7}" type="datetimeFigureOut">
               <a:rPr lang="it-IT" smtClean="0"/>
               <a:pPr/>
-              <a:t>05/03/2016</a:t>
+              <a:t>28/04/2016</a:t>
             </a:fld>
             <a:endParaRPr lang="it-IT"/>
           </a:p>
@@ -1626,7 +2157,7 @@
             <a:fld id="{862B2217-6051-4F56-814D-FF82A88DF6E7}" type="datetimeFigureOut">
               <a:rPr lang="it-IT" smtClean="0"/>
               <a:pPr/>
-              <a:t>05/03/2016</a:t>
+              <a:t>28/04/2016</a:t>
             </a:fld>
             <a:endParaRPr lang="it-IT"/>
           </a:p>
@@ -1803,7 +2334,7 @@
             <a:fld id="{862B2217-6051-4F56-814D-FF82A88DF6E7}" type="datetimeFigureOut">
               <a:rPr lang="it-IT" smtClean="0"/>
               <a:pPr/>
-              <a:t>05/03/2016</a:t>
+              <a:t>28/04/2016</a:t>
             </a:fld>
             <a:endParaRPr lang="it-IT"/>
           </a:p>
@@ -1970,7 +2501,7 @@
             <a:fld id="{862B2217-6051-4F56-814D-FF82A88DF6E7}" type="datetimeFigureOut">
               <a:rPr lang="it-IT" smtClean="0"/>
               <a:pPr/>
-              <a:t>05/03/2016</a:t>
+              <a:t>28/04/2016</a:t>
             </a:fld>
             <a:endParaRPr lang="it-IT"/>
           </a:p>
@@ -2213,7 +2744,7 @@
             <a:fld id="{862B2217-6051-4F56-814D-FF82A88DF6E7}" type="datetimeFigureOut">
               <a:rPr lang="it-IT" smtClean="0"/>
               <a:pPr/>
-              <a:t>05/03/2016</a:t>
+              <a:t>28/04/2016</a:t>
             </a:fld>
             <a:endParaRPr lang="it-IT"/>
           </a:p>
@@ -2498,7 +3029,7 @@
             <a:fld id="{862B2217-6051-4F56-814D-FF82A88DF6E7}" type="datetimeFigureOut">
               <a:rPr lang="it-IT" smtClean="0"/>
               <a:pPr/>
-              <a:t>05/03/2016</a:t>
+              <a:t>28/04/2016</a:t>
             </a:fld>
             <a:endParaRPr lang="it-IT"/>
           </a:p>
@@ -2917,7 +3448,7 @@
             <a:fld id="{862B2217-6051-4F56-814D-FF82A88DF6E7}" type="datetimeFigureOut">
               <a:rPr lang="it-IT" smtClean="0"/>
               <a:pPr/>
-              <a:t>05/03/2016</a:t>
+              <a:t>28/04/2016</a:t>
             </a:fld>
             <a:endParaRPr lang="it-IT"/>
           </a:p>
@@ -3032,7 +3563,7 @@
             <a:fld id="{862B2217-6051-4F56-814D-FF82A88DF6E7}" type="datetimeFigureOut">
               <a:rPr lang="it-IT" smtClean="0"/>
               <a:pPr/>
-              <a:t>05/03/2016</a:t>
+              <a:t>28/04/2016</a:t>
             </a:fld>
             <a:endParaRPr lang="it-IT"/>
           </a:p>
@@ -3124,7 +3655,7 @@
             <a:fld id="{862B2217-6051-4F56-814D-FF82A88DF6E7}" type="datetimeFigureOut">
               <a:rPr lang="it-IT" smtClean="0"/>
               <a:pPr/>
-              <a:t>05/03/2016</a:t>
+              <a:t>28/04/2016</a:t>
             </a:fld>
             <a:endParaRPr lang="it-IT"/>
           </a:p>
@@ -3398,7 +3929,7 @@
             <a:fld id="{862B2217-6051-4F56-814D-FF82A88DF6E7}" type="datetimeFigureOut">
               <a:rPr lang="it-IT" smtClean="0"/>
               <a:pPr/>
-              <a:t>05/03/2016</a:t>
+              <a:t>28/04/2016</a:t>
             </a:fld>
             <a:endParaRPr lang="it-IT"/>
           </a:p>
@@ -3648,7 +4179,7 @@
             <a:fld id="{862B2217-6051-4F56-814D-FF82A88DF6E7}" type="datetimeFigureOut">
               <a:rPr lang="it-IT" smtClean="0"/>
               <a:pPr/>
-              <a:t>05/03/2016</a:t>
+              <a:t>28/04/2016</a:t>
             </a:fld>
             <a:endParaRPr lang="it-IT"/>
           </a:p>
@@ -3858,7 +4389,7 @@
             <a:fld id="{862B2217-6051-4F56-814D-FF82A88DF6E7}" type="datetimeFigureOut">
               <a:rPr lang="it-IT" smtClean="0"/>
               <a:pPr/>
-              <a:t>05/03/2016</a:t>
+              <a:t>28/04/2016</a:t>
             </a:fld>
             <a:endParaRPr lang="it-IT"/>
           </a:p>
@@ -4287,6 +4818,78 @@
 </p:sld>
 </file>
 
+<file path=ppt/slides/slide10.xml><?xml version="1.0" encoding="utf-8"?>
+<p:sld xmlns:a="http://schemas.openxmlformats.org/drawingml/2006/main" xmlns:r="http://schemas.openxmlformats.org/officeDocument/2006/relationships" xmlns:p="http://schemas.openxmlformats.org/presentationml/2006/main">
+  <p:cSld>
+    <p:spTree>
+      <p:nvGrpSpPr>
+        <p:cNvPr id="1" name=""/>
+        <p:cNvGrpSpPr/>
+        <p:nvPr/>
+      </p:nvGrpSpPr>
+      <p:grpSpPr>
+        <a:xfrm>
+          <a:off x="0" y="0"/>
+          <a:ext cx="0" cy="0"/>
+          <a:chOff x="0" y="0"/>
+          <a:chExt cx="0" cy="0"/>
+        </a:xfrm>
+      </p:grpSpPr>
+      <p:sp>
+        <p:nvSpPr>
+          <p:cNvPr id="2" name="Titolo 1"/>
+          <p:cNvSpPr>
+            <a:spLocks noGrp="1"/>
+          </p:cNvSpPr>
+          <p:nvPr>
+            <p:ph type="title"/>
+          </p:nvPr>
+        </p:nvSpPr>
+        <p:spPr/>
+        <p:txBody>
+          <a:bodyPr/>
+          <a:lstStyle/>
+          <a:p>
+            <a:r>
+              <a:rPr lang="it-IT" dirty="0" smtClean="0"/>
+              <a:t>Pian1 vs Pian2 </a:t>
+            </a:r>
+            <a:r>
+              <a:rPr lang="it-IT" dirty="0" smtClean="0"/>
+              <a:t>Codifica</a:t>
+            </a:r>
+            <a:endParaRPr lang="it-IT" dirty="0"/>
+          </a:p>
+        </p:txBody>
+      </p:sp>
+      <p:graphicFrame>
+        <p:nvGraphicFramePr>
+          <p:cNvPr id="4" name="Segnaposto contenuto 3"/>
+          <p:cNvGraphicFramePr>
+            <a:graphicFrameLocks noGrp="1"/>
+          </p:cNvGraphicFramePr>
+          <p:nvPr>
+            <p:ph idx="1"/>
+          </p:nvPr>
+        </p:nvGraphicFramePr>
+        <p:xfrm>
+          <a:off x="457200" y="1600200"/>
+          <a:ext cx="8229600" cy="4525963"/>
+        </p:xfrm>
+        <a:graphic>
+          <a:graphicData uri="http://schemas.openxmlformats.org/drawingml/2006/chart">
+            <c:chart xmlns:c="http://schemas.openxmlformats.org/drawingml/2006/chart" xmlns:r="http://schemas.openxmlformats.org/officeDocument/2006/relationships" r:id="rId2"/>
+          </a:graphicData>
+        </a:graphic>
+      </p:graphicFrame>
+    </p:spTree>
+  </p:cSld>
+  <p:clrMapOvr>
+    <a:masterClrMapping/>
+  </p:clrMapOvr>
+</p:sld>
+</file>
+
 <file path=ppt/slides/slide2.xml><?xml version="1.0" encoding="utf-8"?>
 <p:sld xmlns:a="http://schemas.openxmlformats.org/drawingml/2006/main" xmlns:r="http://schemas.openxmlformats.org/officeDocument/2006/relationships" xmlns:p="http://schemas.openxmlformats.org/presentationml/2006/main">
   <p:cSld>
@@ -4790,6 +5393,148 @@
         <a:graphic>
           <a:graphicData uri="http://schemas.openxmlformats.org/drawingml/2006/chart">
             <c:chart xmlns:c="http://schemas.openxmlformats.org/drawingml/2006/chart" xmlns:r="http://schemas.openxmlformats.org/officeDocument/2006/relationships" r:id="rId3"/>
+          </a:graphicData>
+        </a:graphic>
+      </p:graphicFrame>
+    </p:spTree>
+  </p:cSld>
+  <p:clrMapOvr>
+    <a:masterClrMapping/>
+  </p:clrMapOvr>
+</p:sld>
+</file>
+
+<file path=ppt/slides/slide8.xml><?xml version="1.0" encoding="utf-8"?>
+<p:sld xmlns:a="http://schemas.openxmlformats.org/drawingml/2006/main" xmlns:r="http://schemas.openxmlformats.org/officeDocument/2006/relationships" xmlns:p="http://schemas.openxmlformats.org/presentationml/2006/main">
+  <p:cSld>
+    <p:spTree>
+      <p:nvGrpSpPr>
+        <p:cNvPr id="1" name=""/>
+        <p:cNvGrpSpPr/>
+        <p:nvPr/>
+      </p:nvGrpSpPr>
+      <p:grpSpPr>
+        <a:xfrm>
+          <a:off x="0" y="0"/>
+          <a:ext cx="0" cy="0"/>
+          <a:chOff x="0" y="0"/>
+          <a:chExt cx="0" cy="0"/>
+        </a:xfrm>
+      </p:grpSpPr>
+      <p:sp>
+        <p:nvSpPr>
+          <p:cNvPr id="2" name="Titolo 1"/>
+          <p:cNvSpPr>
+            <a:spLocks noGrp="1"/>
+          </p:cNvSpPr>
+          <p:nvPr>
+            <p:ph type="title"/>
+          </p:nvPr>
+        </p:nvSpPr>
+        <p:spPr/>
+        <p:txBody>
+          <a:bodyPr/>
+          <a:lstStyle/>
+          <a:p>
+            <a:r>
+              <a:rPr lang="it-IT" dirty="0" smtClean="0"/>
+              <a:t>Consuntivo Analisi</a:t>
+            </a:r>
+            <a:endParaRPr lang="it-IT" dirty="0"/>
+          </a:p>
+        </p:txBody>
+      </p:sp>
+      <p:graphicFrame>
+        <p:nvGraphicFramePr>
+          <p:cNvPr id="4" name="Segnaposto contenuto 3"/>
+          <p:cNvGraphicFramePr>
+            <a:graphicFrameLocks noGrp="1"/>
+          </p:cNvGraphicFramePr>
+          <p:nvPr>
+            <p:ph idx="1"/>
+          </p:nvPr>
+        </p:nvGraphicFramePr>
+        <p:xfrm>
+          <a:off x="457200" y="1600200"/>
+          <a:ext cx="8229600" cy="4525963"/>
+        </p:xfrm>
+        <a:graphic>
+          <a:graphicData uri="http://schemas.openxmlformats.org/drawingml/2006/chart">
+            <c:chart xmlns:c="http://schemas.openxmlformats.org/drawingml/2006/chart" xmlns:r="http://schemas.openxmlformats.org/officeDocument/2006/relationships" r:id="rId2"/>
+          </a:graphicData>
+        </a:graphic>
+      </p:graphicFrame>
+    </p:spTree>
+  </p:cSld>
+  <p:clrMapOvr>
+    <a:masterClrMapping/>
+  </p:clrMapOvr>
+</p:sld>
+</file>
+
+<file path=ppt/slides/slide9.xml><?xml version="1.0" encoding="utf-8"?>
+<p:sld xmlns:a="http://schemas.openxmlformats.org/drawingml/2006/main" xmlns:r="http://schemas.openxmlformats.org/officeDocument/2006/relationships" xmlns:p="http://schemas.openxmlformats.org/presentationml/2006/main">
+  <p:cSld>
+    <p:spTree>
+      <p:nvGrpSpPr>
+        <p:cNvPr id="1" name=""/>
+        <p:cNvGrpSpPr/>
+        <p:nvPr/>
+      </p:nvGrpSpPr>
+      <p:grpSpPr>
+        <a:xfrm>
+          <a:off x="0" y="0"/>
+          <a:ext cx="0" cy="0"/>
+          <a:chOff x="0" y="0"/>
+          <a:chExt cx="0" cy="0"/>
+        </a:xfrm>
+      </p:grpSpPr>
+      <p:sp>
+        <p:nvSpPr>
+          <p:cNvPr id="2" name="Titolo 1"/>
+          <p:cNvSpPr>
+            <a:spLocks noGrp="1"/>
+          </p:cNvSpPr>
+          <p:nvPr>
+            <p:ph type="title"/>
+          </p:nvPr>
+        </p:nvSpPr>
+        <p:spPr/>
+        <p:txBody>
+          <a:bodyPr>
+            <a:normAutofit/>
+          </a:bodyPr>
+          <a:lstStyle/>
+          <a:p>
+            <a:r>
+              <a:rPr lang="it-IT" dirty="0" smtClean="0"/>
+              <a:t>Pian1 vs Pian2 </a:t>
+            </a:r>
+            <a:r>
+              <a:rPr lang="it-IT" dirty="0" err="1" smtClean="0"/>
+              <a:t>Prog</a:t>
+            </a:r>
+            <a:endParaRPr lang="it-IT" dirty="0"/>
+          </a:p>
+        </p:txBody>
+      </p:sp>
+      <p:graphicFrame>
+        <p:nvGraphicFramePr>
+          <p:cNvPr id="4" name="Segnaposto contenuto 3"/>
+          <p:cNvGraphicFramePr>
+            <a:graphicFrameLocks noGrp="1"/>
+          </p:cNvGraphicFramePr>
+          <p:nvPr>
+            <p:ph idx="1"/>
+          </p:nvPr>
+        </p:nvGraphicFramePr>
+        <p:xfrm>
+          <a:off x="457200" y="1600200"/>
+          <a:ext cx="8229600" cy="4525963"/>
+        </p:xfrm>
+        <a:graphic>
+          <a:graphicData uri="http://schemas.openxmlformats.org/drawingml/2006/chart">
+            <c:chart xmlns:c="http://schemas.openxmlformats.org/drawingml/2006/chart" xmlns:r="http://schemas.openxmlformats.org/officeDocument/2006/relationships" r:id="rId2"/>
           </a:graphicData>
         </a:graphic>
       </p:graphicFrame>

</xml_diff>

<commit_message>
Ultimate le correzioni del Pdp (si spera)
Pronto per la verifica
</commit_message>
<xml_diff>
--- a/Piano di Progetto/Images/Grafici-PdP.pptx
+++ b/Piano di Progetto/Images/Grafici-PdP.pptx
@@ -163,8 +163,8 @@
               <c:idx val="0"/>
               <c:layout>
                 <c:manualLayout>
-                  <c:x val="3.2617815091518308E-2"/>
-                  <c:y val="2.7042588456945679E-2"/>
+                  <c:x val="3.2617815091518315E-2"/>
+                  <c:y val="2.7042588456945682E-2"/>
                 </c:manualLayout>
               </c:layout>
               <c:dLblPos val="bestFit"/>
@@ -175,8 +175,8 @@
               <c:idx val="1"/>
               <c:layout>
                 <c:manualLayout>
-                  <c:x val="2.2949353553028143E-2"/>
-                  <c:y val="0.1456664581659198"/>
+                  <c:x val="2.294935355302815E-2"/>
+                  <c:y val="0.14566645816591983"/>
                 </c:manualLayout>
               </c:layout>
               <c:dLblPos val="bestFit"/>
@@ -187,7 +187,7 @@
               <c:idx val="2"/>
               <c:layout>
                 <c:manualLayout>
-                  <c:x val="-6.3423529344618881E-2"/>
+                  <c:x val="-6.3423529344618895E-2"/>
                   <c:y val="-1.8930024853629351E-2"/>
                 </c:manualLayout>
               </c:layout>
@@ -199,8 +199,8 @@
               <c:idx val="3"/>
               <c:layout>
                 <c:manualLayout>
-                  <c:x val="-6.8859831859871962E-2"/>
-                  <c:y val="4.5972400376807644E-2"/>
+                  <c:x val="-6.8859831859871976E-2"/>
+                  <c:y val="4.5972400376807651E-2"/>
                 </c:manualLayout>
               </c:layout>
               <c:dLblPos val="bestFit"/>
@@ -279,6 +279,7 @@
 
 <file path=ppt/charts/chart10.xml><?xml version="1.0" encoding="utf-8"?>
 <c:chartSpace xmlns:c="http://schemas.openxmlformats.org/drawingml/2006/chart" xmlns:a="http://schemas.openxmlformats.org/drawingml/2006/main" xmlns:r="http://schemas.openxmlformats.org/officeDocument/2006/relationships">
+  <c:date1904 val="1"/>
   <c:lang val="it-IT"/>
   <c:chart>
     <c:plotArea>
@@ -398,6 +399,7 @@
 
 <file path=ppt/charts/chart12.xml><?xml version="1.0" encoding="utf-8"?>
 <c:chartSpace xmlns:c="http://schemas.openxmlformats.org/drawingml/2006/chart" xmlns:a="http://schemas.openxmlformats.org/drawingml/2006/main" xmlns:r="http://schemas.openxmlformats.org/officeDocument/2006/relationships">
+  <c:date1904 val="1"/>
   <c:lang val="it-IT"/>
   <c:chart>
     <c:plotArea>
@@ -620,24 +622,24 @@
             </c:numRef>
           </c:val>
         </c:ser>
-        <c:axId val="151784832"/>
-        <c:axId val="151901312"/>
+        <c:axId val="96388224"/>
+        <c:axId val="96389760"/>
       </c:barChart>
       <c:catAx>
-        <c:axId val="151784832"/>
+        <c:axId val="96388224"/>
         <c:scaling>
           <c:orientation val="minMax"/>
         </c:scaling>
         <c:axPos val="l"/>
         <c:tickLblPos val="nextTo"/>
-        <c:crossAx val="151901312"/>
+        <c:crossAx val="96389760"/>
         <c:crosses val="autoZero"/>
         <c:auto val="1"/>
         <c:lblAlgn val="ctr"/>
         <c:lblOffset val="100"/>
       </c:catAx>
       <c:valAx>
-        <c:axId val="151901312"/>
+        <c:axId val="96389760"/>
         <c:scaling>
           <c:orientation val="minMax"/>
         </c:scaling>
@@ -645,7 +647,7 @@
         <c:majorGridlines/>
         <c:numFmt formatCode="General" sourceLinked="1"/>
         <c:tickLblPos val="nextTo"/>
-        <c:crossAx val="151784832"/>
+        <c:crossAx val="96388224"/>
         <c:crosses val="autoZero"/>
         <c:crossBetween val="between"/>
       </c:valAx>
@@ -724,10 +726,10 @@
                   <c:v>15</c:v>
                 </c:pt>
                 <c:pt idx="3">
-                  <c:v>111</c:v>
+                  <c:v>75</c:v>
                 </c:pt>
                 <c:pt idx="4">
-                  <c:v>80</c:v>
+                  <c:v>74</c:v>
                 </c:pt>
               </c:numCache>
             </c:numRef>
@@ -794,24 +796,24 @@
             </c:numRef>
           </c:val>
         </c:ser>
-        <c:axId val="117634176"/>
-        <c:axId val="117635712"/>
+        <c:axId val="78342784"/>
+        <c:axId val="78365440"/>
       </c:barChart>
       <c:catAx>
-        <c:axId val="117634176"/>
+        <c:axId val="78342784"/>
         <c:scaling>
           <c:orientation val="minMax"/>
         </c:scaling>
         <c:axPos val="l"/>
         <c:tickLblPos val="nextTo"/>
-        <c:crossAx val="117635712"/>
+        <c:crossAx val="78365440"/>
         <c:crosses val="autoZero"/>
         <c:auto val="1"/>
         <c:lblAlgn val="ctr"/>
         <c:lblOffset val="100"/>
       </c:catAx>
       <c:valAx>
-        <c:axId val="117635712"/>
+        <c:axId val="78365440"/>
         <c:scaling>
           <c:orientation val="minMax"/>
         </c:scaling>
@@ -819,7 +821,7 @@
         <c:majorGridlines/>
         <c:numFmt formatCode="General" sourceLinked="1"/>
         <c:tickLblPos val="nextTo"/>
-        <c:crossAx val="117634176"/>
+        <c:crossAx val="78342784"/>
         <c:crosses val="autoZero"/>
         <c:crossBetween val="between"/>
       </c:valAx>
@@ -854,10 +856,10 @@
           <c:layoutTarget val="inner"/>
           <c:xMode val="edge"/>
           <c:yMode val="edge"/>
-          <c:x val="0.22371062992125978"/>
+          <c:x val="0.22371062992125976"/>
           <c:y val="5.0925925925925923E-2"/>
-          <c:w val="0.49754768153980777"/>
-          <c:h val="0.83309419655876382"/>
+          <c:w val="0.49754768153980788"/>
+          <c:h val="0.83309419655876393"/>
         </c:manualLayout>
       </c:layout>
       <c:barChart>
@@ -905,19 +907,19 @@
                   <c:v>15</c:v>
                 </c:pt>
                 <c:pt idx="1">
-                  <c:v>10</c:v>
+                  <c:v>12</c:v>
                 </c:pt>
                 <c:pt idx="2">
                   <c:v>15</c:v>
                 </c:pt>
                 <c:pt idx="3">
-                  <c:v>20</c:v>
+                  <c:v>44</c:v>
                 </c:pt>
                 <c:pt idx="4">
-                  <c:v>108</c:v>
+                  <c:v>104</c:v>
                 </c:pt>
                 <c:pt idx="5">
-                  <c:v>71</c:v>
+                  <c:v>91</c:v>
                 </c:pt>
               </c:numCache>
             </c:numRef>
@@ -990,24 +992,24 @@
             </c:numRef>
           </c:val>
         </c:ser>
-        <c:axId val="103250560"/>
-        <c:axId val="103261312"/>
+        <c:axId val="117834496"/>
+        <c:axId val="153231360"/>
       </c:barChart>
       <c:catAx>
-        <c:axId val="103250560"/>
+        <c:axId val="117834496"/>
         <c:scaling>
           <c:orientation val="minMax"/>
         </c:scaling>
         <c:axPos val="l"/>
         <c:tickLblPos val="nextTo"/>
-        <c:crossAx val="103261312"/>
+        <c:crossAx val="153231360"/>
         <c:crosses val="autoZero"/>
         <c:auto val="1"/>
         <c:lblAlgn val="ctr"/>
         <c:lblOffset val="100"/>
       </c:catAx>
       <c:valAx>
-        <c:axId val="103261312"/>
+        <c:axId val="153231360"/>
         <c:scaling>
           <c:orientation val="minMax"/>
           <c:max val="120"/>
@@ -1016,7 +1018,7 @@
         <c:majorGridlines/>
         <c:numFmt formatCode="General" sourceLinked="1"/>
         <c:tickLblPos val="nextTo"/>
-        <c:crossAx val="103250560"/>
+        <c:crossAx val="117834496"/>
         <c:crosses val="autoZero"/>
         <c:crossBetween val="between"/>
         <c:majorUnit val="30"/>
@@ -1109,6 +1111,7 @@
 
 <file path=ppt/charts/chart4.xml><?xml version="1.0" encoding="utf-8"?>
 <c:chartSpace xmlns:c="http://schemas.openxmlformats.org/drawingml/2006/chart" xmlns:a="http://schemas.openxmlformats.org/drawingml/2006/main" xmlns:r="http://schemas.openxmlformats.org/officeDocument/2006/relationships">
+  <c:date1904 val="1"/>
   <c:lang val="it-IT"/>
   <c:chart>
     <c:plotArea>
@@ -1118,8 +1121,8 @@
           <c:xMode val="edge"/>
           <c:yMode val="edge"/>
           <c:x val="0.20663090811260623"/>
-          <c:y val="0.11861750209572672"/>
-          <c:w val="0.53869875569381198"/>
+          <c:y val="0.1186175020957267"/>
+          <c:w val="0.5386987556938122"/>
           <c:h val="0.81621023589971486"/>
         </c:manualLayout>
       </c:layout>
@@ -1133,8 +1136,8 @@
               <c:idx val="0"/>
               <c:layout>
                 <c:manualLayout>
-                  <c:x val="5.7539856682590811E-2"/>
-                  <c:y val="1.3361310022792082E-2"/>
+                  <c:x val="5.7539856682590804E-2"/>
+                  <c:y val="1.3361310022792084E-2"/>
                 </c:manualLayout>
               </c:layout>
               <c:dLblPos val="bestFit"/>
@@ -1147,7 +1150,7 @@
               <c:idx val="1"/>
               <c:layout>
                 <c:manualLayout>
-                  <c:x val="7.7777777777777793E-2"/>
+                  <c:x val="7.7777777777777807E-2"/>
                   <c:y val="0"/>
                 </c:manualLayout>
               </c:layout>
@@ -1161,8 +1164,8 @@
               <c:idx val="2"/>
               <c:layout>
                 <c:manualLayout>
-                  <c:x val="3.1325767725154732E-2"/>
-                  <c:y val="-6.9615581433712772E-3"/>
+                  <c:x val="3.1325767725154739E-2"/>
+                  <c:y val="-6.9615581433712789E-3"/>
                 </c:manualLayout>
               </c:layout>
               <c:tx>
@@ -1196,7 +1199,7 @@
               <c:idx val="3"/>
               <c:layout>
                 <c:manualLayout>
-                  <c:x val="6.0097072547494738E-2"/>
+                  <c:x val="6.0097072547494745E-2"/>
                   <c:y val="-1.2799293344510543E-2"/>
                 </c:manualLayout>
               </c:layout>
@@ -1214,7 +1217,7 @@
               <c:idx val="5"/>
               <c:layout>
                 <c:manualLayout>
-                  <c:x val="-4.1666666666666671E-2"/>
+                  <c:x val="-4.1666666666666678E-2"/>
                   <c:y val="0"/>
                 </c:manualLayout>
               </c:layout>
@@ -1349,8 +1352,8 @@
           <c:xMode val="edge"/>
           <c:yMode val="edge"/>
           <c:x val="0.24101021360874433"/>
-          <c:y val="0.1346510741230772"/>
-          <c:w val="0.5179795727825115"/>
+          <c:y val="0.13465107412307717"/>
+          <c:w val="0.51797957278251161"/>
           <c:h val="0.81621023589971486"/>
         </c:manualLayout>
       </c:layout>
@@ -1398,7 +1401,7 @@
               <c:idx val="2"/>
               <c:layout>
                 <c:manualLayout>
-                  <c:x val="2.7863624127233734E-2"/>
+                  <c:x val="2.7863624127233741E-2"/>
                   <c:y val="-4.6295361121491563E-3"/>
                 </c:manualLayout>
               </c:layout>
@@ -1462,8 +1465,8 @@
               <c:idx val="5"/>
               <c:layout>
                 <c:manualLayout>
-                  <c:x val="-0.10219390687359525"/>
-                  <c:y val="-1.8726875465015585E-4"/>
+                  <c:x val="-0.10219390687359527"/>
+                  <c:y val="-1.8726875465015593E-4"/>
                 </c:manualLayout>
               </c:layout>
               <c:dLblPos val="bestFit"/>
@@ -1605,9 +1608,9 @@
           <c:xMode val="edge"/>
           <c:yMode val="edge"/>
           <c:x val="0.27083333333333326"/>
-          <c:y val="0.113425925925926"/>
-          <c:w val="0.46388888888888957"/>
-          <c:h val="0.77314814814814892"/>
+          <c:y val="0.11342592592592601"/>
+          <c:w val="0.46388888888888968"/>
+          <c:h val="0.77314814814814903"/>
         </c:manualLayout>
       </c:layout>
       <c:pieChart>
@@ -1640,7 +1643,7 @@
               <c:layout>
                 <c:manualLayout>
                   <c:x val="3.333333333333334E-2"/>
-                  <c:y val="1.3888888888888907E-2"/>
+                  <c:y val="1.3888888888888911E-2"/>
                 </c:manualLayout>
               </c:layout>
               <c:dLblPos val="bestFit"/>
@@ -1671,8 +1674,8 @@
               <c:idx val="3"/>
               <c:layout>
                 <c:manualLayout>
-                  <c:x val="3.0555555555555575E-2"/>
-                  <c:y val="2.7777777777777832E-2"/>
+                  <c:x val="3.0555555555555579E-2"/>
+                  <c:y val="2.7777777777777842E-2"/>
                 </c:manualLayout>
               </c:layout>
               <c:dLblPos val="bestFit"/>
@@ -1686,7 +1689,7 @@
               <c:layout>
                 <c:manualLayout>
                   <c:x val="3.333333333333334E-2"/>
-                  <c:y val="-9.2592592592592778E-3"/>
+                  <c:y val="-9.2592592592592813E-3"/>
                 </c:manualLayout>
               </c:layout>
               <c:dLblPos val="bestFit"/>
@@ -1990,7 +1993,7 @@
             <a:fld id="{862B2217-6051-4F56-814D-FF82A88DF6E7}" type="datetimeFigureOut">
               <a:rPr lang="it-IT" smtClean="0"/>
               <a:pPr/>
-              <a:t>28/04/2016</a:t>
+              <a:t>03/05/2016</a:t>
             </a:fld>
             <a:endParaRPr lang="it-IT"/>
           </a:p>
@@ -2157,7 +2160,7 @@
             <a:fld id="{862B2217-6051-4F56-814D-FF82A88DF6E7}" type="datetimeFigureOut">
               <a:rPr lang="it-IT" smtClean="0"/>
               <a:pPr/>
-              <a:t>28/04/2016</a:t>
+              <a:t>03/05/2016</a:t>
             </a:fld>
             <a:endParaRPr lang="it-IT"/>
           </a:p>
@@ -2334,7 +2337,7 @@
             <a:fld id="{862B2217-6051-4F56-814D-FF82A88DF6E7}" type="datetimeFigureOut">
               <a:rPr lang="it-IT" smtClean="0"/>
               <a:pPr/>
-              <a:t>28/04/2016</a:t>
+              <a:t>03/05/2016</a:t>
             </a:fld>
             <a:endParaRPr lang="it-IT"/>
           </a:p>
@@ -2501,7 +2504,7 @@
             <a:fld id="{862B2217-6051-4F56-814D-FF82A88DF6E7}" type="datetimeFigureOut">
               <a:rPr lang="it-IT" smtClean="0"/>
               <a:pPr/>
-              <a:t>28/04/2016</a:t>
+              <a:t>03/05/2016</a:t>
             </a:fld>
             <a:endParaRPr lang="it-IT"/>
           </a:p>
@@ -2744,7 +2747,7 @@
             <a:fld id="{862B2217-6051-4F56-814D-FF82A88DF6E7}" type="datetimeFigureOut">
               <a:rPr lang="it-IT" smtClean="0"/>
               <a:pPr/>
-              <a:t>28/04/2016</a:t>
+              <a:t>03/05/2016</a:t>
             </a:fld>
             <a:endParaRPr lang="it-IT"/>
           </a:p>
@@ -3029,7 +3032,7 @@
             <a:fld id="{862B2217-6051-4F56-814D-FF82A88DF6E7}" type="datetimeFigureOut">
               <a:rPr lang="it-IT" smtClean="0"/>
               <a:pPr/>
-              <a:t>28/04/2016</a:t>
+              <a:t>03/05/2016</a:t>
             </a:fld>
             <a:endParaRPr lang="it-IT"/>
           </a:p>
@@ -3448,7 +3451,7 @@
             <a:fld id="{862B2217-6051-4F56-814D-FF82A88DF6E7}" type="datetimeFigureOut">
               <a:rPr lang="it-IT" smtClean="0"/>
               <a:pPr/>
-              <a:t>28/04/2016</a:t>
+              <a:t>03/05/2016</a:t>
             </a:fld>
             <a:endParaRPr lang="it-IT"/>
           </a:p>
@@ -3563,7 +3566,7 @@
             <a:fld id="{862B2217-6051-4F56-814D-FF82A88DF6E7}" type="datetimeFigureOut">
               <a:rPr lang="it-IT" smtClean="0"/>
               <a:pPr/>
-              <a:t>28/04/2016</a:t>
+              <a:t>03/05/2016</a:t>
             </a:fld>
             <a:endParaRPr lang="it-IT"/>
           </a:p>
@@ -3655,7 +3658,7 @@
             <a:fld id="{862B2217-6051-4F56-814D-FF82A88DF6E7}" type="datetimeFigureOut">
               <a:rPr lang="it-IT" smtClean="0"/>
               <a:pPr/>
-              <a:t>28/04/2016</a:t>
+              <a:t>03/05/2016</a:t>
             </a:fld>
             <a:endParaRPr lang="it-IT"/>
           </a:p>
@@ -3929,7 +3932,7 @@
             <a:fld id="{862B2217-6051-4F56-814D-FF82A88DF6E7}" type="datetimeFigureOut">
               <a:rPr lang="it-IT" smtClean="0"/>
               <a:pPr/>
-              <a:t>28/04/2016</a:t>
+              <a:t>03/05/2016</a:t>
             </a:fld>
             <a:endParaRPr lang="it-IT"/>
           </a:p>
@@ -4179,7 +4182,7 @@
             <a:fld id="{862B2217-6051-4F56-814D-FF82A88DF6E7}" type="datetimeFigureOut">
               <a:rPr lang="it-IT" smtClean="0"/>
               <a:pPr/>
-              <a:t>28/04/2016</a:t>
+              <a:t>03/05/2016</a:t>
             </a:fld>
             <a:endParaRPr lang="it-IT"/>
           </a:p>
@@ -4389,7 +4392,7 @@
             <a:fld id="{862B2217-6051-4F56-814D-FF82A88DF6E7}" type="datetimeFigureOut">
               <a:rPr lang="it-IT" smtClean="0"/>
               <a:pPr/>
-              <a:t>28/04/2016</a:t>
+              <a:t>03/05/2016</a:t>
             </a:fld>
             <a:endParaRPr lang="it-IT"/>
           </a:p>
@@ -4852,11 +4855,7 @@
           <a:p>
             <a:r>
               <a:rPr lang="it-IT" dirty="0" smtClean="0"/>
-              <a:t>Pian1 vs Pian2 </a:t>
-            </a:r>
-            <a:r>
-              <a:rPr lang="it-IT" dirty="0" smtClean="0"/>
-              <a:t>Codifica</a:t>
+              <a:t>Pian1 vs Pian2 Codifica</a:t>
             </a:r>
             <a:endParaRPr lang="it-IT" dirty="0"/>
           </a:p>
@@ -4864,7 +4863,7 @@
       </p:sp>
       <p:graphicFrame>
         <p:nvGraphicFramePr>
-          <p:cNvPr id="4" name="Segnaposto contenuto 3"/>
+          <p:cNvPr id="6" name="Segnaposto contenuto 5"/>
           <p:cNvGraphicFramePr>
             <a:graphicFrameLocks noGrp="1"/>
           </p:cNvGraphicFramePr>
@@ -4873,7 +4872,7 @@
           </p:nvPr>
         </p:nvGraphicFramePr>
         <p:xfrm>
-          <a:off x="457200" y="1600200"/>
+          <a:off x="611560" y="1844824"/>
           <a:ext cx="8229600" cy="4525963"/>
         </p:xfrm>
         <a:graphic>
@@ -5520,7 +5519,7 @@
       </p:sp>
       <p:graphicFrame>
         <p:nvGraphicFramePr>
-          <p:cNvPr id="4" name="Segnaposto contenuto 3"/>
+          <p:cNvPr id="6" name="Segnaposto contenuto 5"/>
           <p:cNvGraphicFramePr>
             <a:graphicFrameLocks noGrp="1"/>
           </p:cNvGraphicFramePr>

</xml_diff>